<commit_message>
Conceptual Data Model documented, 100% Design and implementation 25%
</commit_message>
<xml_diff>
--- a/07_Asciidoc/src/main/asciidoc/images/ePO-Objectives-Scope.pptx
+++ b/07_Asciidoc/src/main/asciidoc/images/ePO-Objectives-Scope.pptx
@@ -104,6 +104,11 @@
       </a:defRPr>
     </a:lvl9pPr>
   </p:defaultTextStyle>
+  <p:extLst>
+    <p:ext uri="{EFAFB233-063F-42B5-8137-9DF3F51BA10A}">
+      <p15:sldGuideLst xmlns:p15="http://schemas.microsoft.com/office/powerpoint/2012/main"/>
+    </p:ext>
+  </p:extLst>
 </p:presentation>
 </file>
 
@@ -238,7 +243,7 @@
           <a:p>
             <a:fld id="{2FC1702F-4BF0-4571-81BD-CF29A057A072}" type="datetimeFigureOut">
               <a:rPr lang="es-ES" smtClean="0"/>
-              <a:t>23/07/2018</a:t>
+              <a:t>31/07/2018</a:t>
             </a:fld>
             <a:endParaRPr lang="es-ES"/>
           </a:p>
@@ -408,7 +413,7 @@
           <a:p>
             <a:fld id="{2FC1702F-4BF0-4571-81BD-CF29A057A072}" type="datetimeFigureOut">
               <a:rPr lang="es-ES" smtClean="0"/>
-              <a:t>23/07/2018</a:t>
+              <a:t>31/07/2018</a:t>
             </a:fld>
             <a:endParaRPr lang="es-ES"/>
           </a:p>
@@ -588,7 +593,7 @@
           <a:p>
             <a:fld id="{2FC1702F-4BF0-4571-81BD-CF29A057A072}" type="datetimeFigureOut">
               <a:rPr lang="es-ES" smtClean="0"/>
-              <a:t>23/07/2018</a:t>
+              <a:t>31/07/2018</a:t>
             </a:fld>
             <a:endParaRPr lang="es-ES"/>
           </a:p>
@@ -758,7 +763,7 @@
           <a:p>
             <a:fld id="{2FC1702F-4BF0-4571-81BD-CF29A057A072}" type="datetimeFigureOut">
               <a:rPr lang="es-ES" smtClean="0"/>
-              <a:t>23/07/2018</a:t>
+              <a:t>31/07/2018</a:t>
             </a:fld>
             <a:endParaRPr lang="es-ES"/>
           </a:p>
@@ -1004,7 +1009,7 @@
           <a:p>
             <a:fld id="{2FC1702F-4BF0-4571-81BD-CF29A057A072}" type="datetimeFigureOut">
               <a:rPr lang="es-ES" smtClean="0"/>
-              <a:t>23/07/2018</a:t>
+              <a:t>31/07/2018</a:t>
             </a:fld>
             <a:endParaRPr lang="es-ES"/>
           </a:p>
@@ -1236,7 +1241,7 @@
           <a:p>
             <a:fld id="{2FC1702F-4BF0-4571-81BD-CF29A057A072}" type="datetimeFigureOut">
               <a:rPr lang="es-ES" smtClean="0"/>
-              <a:t>23/07/2018</a:t>
+              <a:t>31/07/2018</a:t>
             </a:fld>
             <a:endParaRPr lang="es-ES"/>
           </a:p>
@@ -1603,7 +1608,7 @@
           <a:p>
             <a:fld id="{2FC1702F-4BF0-4571-81BD-CF29A057A072}" type="datetimeFigureOut">
               <a:rPr lang="es-ES" smtClean="0"/>
-              <a:t>23/07/2018</a:t>
+              <a:t>31/07/2018</a:t>
             </a:fld>
             <a:endParaRPr lang="es-ES"/>
           </a:p>
@@ -1721,7 +1726,7 @@
           <a:p>
             <a:fld id="{2FC1702F-4BF0-4571-81BD-CF29A057A072}" type="datetimeFigureOut">
               <a:rPr lang="es-ES" smtClean="0"/>
-              <a:t>23/07/2018</a:t>
+              <a:t>31/07/2018</a:t>
             </a:fld>
             <a:endParaRPr lang="es-ES"/>
           </a:p>
@@ -1816,7 +1821,7 @@
           <a:p>
             <a:fld id="{2FC1702F-4BF0-4571-81BD-CF29A057A072}" type="datetimeFigureOut">
               <a:rPr lang="es-ES" smtClean="0"/>
-              <a:t>23/07/2018</a:t>
+              <a:t>31/07/2018</a:t>
             </a:fld>
             <a:endParaRPr lang="es-ES"/>
           </a:p>
@@ -2093,7 +2098,7 @@
           <a:p>
             <a:fld id="{2FC1702F-4BF0-4571-81BD-CF29A057A072}" type="datetimeFigureOut">
               <a:rPr lang="es-ES" smtClean="0"/>
-              <a:t>23/07/2018</a:t>
+              <a:t>31/07/2018</a:t>
             </a:fld>
             <a:endParaRPr lang="es-ES"/>
           </a:p>
@@ -2346,7 +2351,7 @@
           <a:p>
             <a:fld id="{2FC1702F-4BF0-4571-81BD-CF29A057A072}" type="datetimeFigureOut">
               <a:rPr lang="es-ES" smtClean="0"/>
-              <a:t>23/07/2018</a:t>
+              <a:t>31/07/2018</a:t>
             </a:fld>
             <a:endParaRPr lang="es-ES"/>
           </a:p>
@@ -2559,7 +2564,7 @@
           <a:p>
             <a:fld id="{2FC1702F-4BF0-4571-81BD-CF29A057A072}" type="datetimeFigureOut">
               <a:rPr lang="es-ES" smtClean="0"/>
-              <a:t>23/07/2018</a:t>
+              <a:t>31/07/2018</a:t>
             </a:fld>
             <a:endParaRPr lang="es-ES"/>
           </a:p>
@@ -2996,8 +3001,8 @@
         </p:nvSpPr>
         <p:spPr>
           <a:xfrm>
-            <a:off x="3835021" y="382137"/>
-            <a:ext cx="4667534" cy="1064526"/>
+            <a:off x="3835021" y="274320"/>
+            <a:ext cx="4667534" cy="1172343"/>
           </a:xfrm>
           <a:prstGeom prst="roundRect">
             <a:avLst/>
@@ -3038,17 +3043,20 @@
       </p:sp>
       <p:sp>
         <p:nvSpPr>
-          <p:cNvPr id="6" name="Rectángulo redondeado 5"/>
+          <p:cNvPr id="7" name="Forma en L 6"/>
           <p:cNvSpPr/>
           <p:nvPr/>
         </p:nvSpPr>
         <p:spPr>
-          <a:xfrm>
-            <a:off x="184678" y="2061029"/>
-            <a:ext cx="4532465" cy="3773714"/>
+          <a:xfrm rot="16200000">
+            <a:off x="5355774" y="2453366"/>
+            <a:ext cx="2220686" cy="4139295"/>
           </a:xfrm>
-          <a:prstGeom prst="roundRect">
-            <a:avLst/>
+          <a:prstGeom prst="corner">
+            <a:avLst>
+              <a:gd name="adj1" fmla="val 94805"/>
+              <a:gd name="adj2" fmla="val 44663"/>
+            </a:avLst>
           </a:prstGeom>
           <a:solidFill>
             <a:schemeClr val="accent1">

</xml_diff>

<commit_message>
First draft of the document completed.
</commit_message>
<xml_diff>
--- a/07_Asciidoc/src/main/asciidoc/images/ePO-Objectives-Scope.pptx
+++ b/07_Asciidoc/src/main/asciidoc/images/ePO-Objectives-Scope.pptx
@@ -243,7 +243,7 @@
           <a:p>
             <a:fld id="{2FC1702F-4BF0-4571-81BD-CF29A057A072}" type="datetimeFigureOut">
               <a:rPr lang="es-ES" smtClean="0"/>
-              <a:t>31/07/2018</a:t>
+              <a:t>01/08/2018</a:t>
             </a:fld>
             <a:endParaRPr lang="es-ES"/>
           </a:p>
@@ -413,7 +413,7 @@
           <a:p>
             <a:fld id="{2FC1702F-4BF0-4571-81BD-CF29A057A072}" type="datetimeFigureOut">
               <a:rPr lang="es-ES" smtClean="0"/>
-              <a:t>31/07/2018</a:t>
+              <a:t>01/08/2018</a:t>
             </a:fld>
             <a:endParaRPr lang="es-ES"/>
           </a:p>
@@ -593,7 +593,7 @@
           <a:p>
             <a:fld id="{2FC1702F-4BF0-4571-81BD-CF29A057A072}" type="datetimeFigureOut">
               <a:rPr lang="es-ES" smtClean="0"/>
-              <a:t>31/07/2018</a:t>
+              <a:t>01/08/2018</a:t>
             </a:fld>
             <a:endParaRPr lang="es-ES"/>
           </a:p>
@@ -763,7 +763,7 @@
           <a:p>
             <a:fld id="{2FC1702F-4BF0-4571-81BD-CF29A057A072}" type="datetimeFigureOut">
               <a:rPr lang="es-ES" smtClean="0"/>
-              <a:t>31/07/2018</a:t>
+              <a:t>01/08/2018</a:t>
             </a:fld>
             <a:endParaRPr lang="es-ES"/>
           </a:p>
@@ -1009,7 +1009,7 @@
           <a:p>
             <a:fld id="{2FC1702F-4BF0-4571-81BD-CF29A057A072}" type="datetimeFigureOut">
               <a:rPr lang="es-ES" smtClean="0"/>
-              <a:t>31/07/2018</a:t>
+              <a:t>01/08/2018</a:t>
             </a:fld>
             <a:endParaRPr lang="es-ES"/>
           </a:p>
@@ -1241,7 +1241,7 @@
           <a:p>
             <a:fld id="{2FC1702F-4BF0-4571-81BD-CF29A057A072}" type="datetimeFigureOut">
               <a:rPr lang="es-ES" smtClean="0"/>
-              <a:t>31/07/2018</a:t>
+              <a:t>01/08/2018</a:t>
             </a:fld>
             <a:endParaRPr lang="es-ES"/>
           </a:p>
@@ -1608,7 +1608,7 @@
           <a:p>
             <a:fld id="{2FC1702F-4BF0-4571-81BD-CF29A057A072}" type="datetimeFigureOut">
               <a:rPr lang="es-ES" smtClean="0"/>
-              <a:t>31/07/2018</a:t>
+              <a:t>01/08/2018</a:t>
             </a:fld>
             <a:endParaRPr lang="es-ES"/>
           </a:p>
@@ -1726,7 +1726,7 @@
           <a:p>
             <a:fld id="{2FC1702F-4BF0-4571-81BD-CF29A057A072}" type="datetimeFigureOut">
               <a:rPr lang="es-ES" smtClean="0"/>
-              <a:t>31/07/2018</a:t>
+              <a:t>01/08/2018</a:t>
             </a:fld>
             <a:endParaRPr lang="es-ES"/>
           </a:p>
@@ -1821,7 +1821,7 @@
           <a:p>
             <a:fld id="{2FC1702F-4BF0-4571-81BD-CF29A057A072}" type="datetimeFigureOut">
               <a:rPr lang="es-ES" smtClean="0"/>
-              <a:t>31/07/2018</a:t>
+              <a:t>01/08/2018</a:t>
             </a:fld>
             <a:endParaRPr lang="es-ES"/>
           </a:p>
@@ -2098,7 +2098,7 @@
           <a:p>
             <a:fld id="{2FC1702F-4BF0-4571-81BD-CF29A057A072}" type="datetimeFigureOut">
               <a:rPr lang="es-ES" smtClean="0"/>
-              <a:t>31/07/2018</a:t>
+              <a:t>01/08/2018</a:t>
             </a:fld>
             <a:endParaRPr lang="es-ES"/>
           </a:p>
@@ -2351,7 +2351,7 @@
           <a:p>
             <a:fld id="{2FC1702F-4BF0-4571-81BD-CF29A057A072}" type="datetimeFigureOut">
               <a:rPr lang="es-ES" smtClean="0"/>
-              <a:t>31/07/2018</a:t>
+              <a:t>01/08/2018</a:t>
             </a:fld>
             <a:endParaRPr lang="es-ES"/>
           </a:p>
@@ -2564,7 +2564,7 @@
           <a:p>
             <a:fld id="{2FC1702F-4BF0-4571-81BD-CF29A057A072}" type="datetimeFigureOut">
               <a:rPr lang="es-ES" smtClean="0"/>
-              <a:t>31/07/2018</a:t>
+              <a:t>01/08/2018</a:t>
             </a:fld>
             <a:endParaRPr lang="es-ES"/>
           </a:p>
@@ -3043,20 +3043,17 @@
       </p:sp>
       <p:sp>
         <p:nvSpPr>
-          <p:cNvPr id="7" name="Forma en L 6"/>
+          <p:cNvPr id="6" name="Rectángulo redondeado 5"/>
           <p:cNvSpPr/>
           <p:nvPr/>
         </p:nvSpPr>
         <p:spPr>
-          <a:xfrm rot="16200000">
-            <a:off x="5355774" y="2453366"/>
-            <a:ext cx="2220686" cy="4139295"/>
+          <a:xfrm>
+            <a:off x="8703354" y="773853"/>
+            <a:ext cx="3096760" cy="3145004"/>
           </a:xfrm>
-          <a:prstGeom prst="corner">
-            <a:avLst>
-              <a:gd name="adj1" fmla="val 94805"/>
-              <a:gd name="adj2" fmla="val 44663"/>
-            </a:avLst>
+          <a:prstGeom prst="roundRect">
+            <a:avLst/>
           </a:prstGeom>
           <a:solidFill>
             <a:schemeClr val="accent1">

</xml_diff>